<commit_message>
Finished presentation explaining web pages and timeline, updated timeline
</commit_message>
<xml_diff>
--- a/Documentation/Database.pptx
+++ b/Documentation/Database.pptx
@@ -15,6 +15,11 @@
     <p:sldId id="263" r:id="rId9"/>
     <p:sldId id="264" r:id="rId10"/>
     <p:sldId id="265" r:id="rId11"/>
+    <p:sldId id="266" r:id="rId12"/>
+    <p:sldId id="267" r:id="rId13"/>
+    <p:sldId id="268" r:id="rId14"/>
+    <p:sldId id="269" r:id="rId15"/>
+    <p:sldId id="270" r:id="rId16"/>
   </p:sldIdLst>
   <p:sldSz cx="12192000" cy="6858000"/>
   <p:notesSz cx="6858000" cy="9144000"/>
@@ -113,6 +118,11 @@
       </a:defRPr>
     </a:lvl9pPr>
   </p:defaultTextStyle>
+  <p:extLst>
+    <p:ext uri="{EFAFB233-063F-42B5-8137-9DF3F51BA10A}">
+      <p15:sldGuideLst xmlns:p15="http://schemas.microsoft.com/office/powerpoint/2012/main"/>
+    </p:ext>
+  </p:extLst>
 </p:presentation>
 </file>
 
@@ -362,7 +372,7 @@
             <a:fld id="{B61BEF0D-F0BB-DE4B-95CE-6DB70DBA9567}" type="datetimeFigureOut">
               <a:rPr lang="en-US" dirty="0"/>
               <a:pPr/>
-              <a:t>1/11/2024</a:t>
+              <a:t>2024-01-12</a:t>
             </a:fld>
             <a:endParaRPr lang="en-US" dirty="0"/>
           </a:p>
@@ -621,7 +631,7 @@
             <a:fld id="{B61BEF0D-F0BB-DE4B-95CE-6DB70DBA9567}" type="datetimeFigureOut">
               <a:rPr lang="en-US" dirty="0"/>
               <a:pPr/>
-              <a:t>1/11/2024</a:t>
+              <a:t>2024-01-12</a:t>
             </a:fld>
             <a:endParaRPr lang="en-US" dirty="0"/>
           </a:p>
@@ -853,7 +863,7 @@
             <a:fld id="{B61BEF0D-F0BB-DE4B-95CE-6DB70DBA9567}" type="datetimeFigureOut">
               <a:rPr lang="en-US" dirty="0"/>
               <a:pPr/>
-              <a:t>1/11/2024</a:t>
+              <a:t>2024-01-12</a:t>
             </a:fld>
             <a:endParaRPr lang="en-US" dirty="0"/>
           </a:p>
@@ -1090,7 +1100,7 @@
             <a:fld id="{B61BEF0D-F0BB-DE4B-95CE-6DB70DBA9567}" type="datetimeFigureOut">
               <a:rPr lang="en-US" dirty="0"/>
               <a:pPr/>
-              <a:t>1/11/2024</a:t>
+              <a:t>2024-01-12</a:t>
             </a:fld>
             <a:endParaRPr lang="en-US" dirty="0"/>
           </a:p>
@@ -1394,7 +1404,7 @@
             <a:fld id="{B61BEF0D-F0BB-DE4B-95CE-6DB70DBA9567}" type="datetimeFigureOut">
               <a:rPr lang="en-US" dirty="0"/>
               <a:pPr/>
-              <a:t>1/11/2024</a:t>
+              <a:t>2024-01-12</a:t>
             </a:fld>
             <a:endParaRPr lang="en-US" dirty="0"/>
           </a:p>
@@ -1693,7 +1703,7 @@
             <a:fld id="{B61BEF0D-F0BB-DE4B-95CE-6DB70DBA9567}" type="datetimeFigureOut">
               <a:rPr lang="en-US" dirty="0"/>
               <a:pPr/>
-              <a:t>1/11/2024</a:t>
+              <a:t>2024-01-12</a:t>
             </a:fld>
             <a:endParaRPr lang="en-US" dirty="0"/>
           </a:p>
@@ -2112,7 +2122,7 @@
             <a:fld id="{B61BEF0D-F0BB-DE4B-95CE-6DB70DBA9567}" type="datetimeFigureOut">
               <a:rPr lang="en-US" dirty="0"/>
               <a:pPr/>
-              <a:t>1/11/2024</a:t>
+              <a:t>2024-01-12</a:t>
             </a:fld>
             <a:endParaRPr lang="en-US" dirty="0"/>
           </a:p>
@@ -2271,7 +2281,7 @@
             <a:fld id="{B61BEF0D-F0BB-DE4B-95CE-6DB70DBA9567}" type="datetimeFigureOut">
               <a:rPr lang="en-US" dirty="0"/>
               <a:pPr/>
-              <a:t>1/11/2024</a:t>
+              <a:t>2024-01-12</a:t>
             </a:fld>
             <a:endParaRPr lang="en-US" dirty="0"/>
           </a:p>
@@ -2363,7 +2373,7 @@
             <a:fld id="{B61BEF0D-F0BB-DE4B-95CE-6DB70DBA9567}" type="datetimeFigureOut">
               <a:rPr lang="en-US" dirty="0"/>
               <a:pPr/>
-              <a:t>1/11/2024</a:t>
+              <a:t>2024-01-12</a:t>
             </a:fld>
             <a:endParaRPr lang="en-US" dirty="0"/>
           </a:p>
@@ -2738,7 +2748,7 @@
             <a:fld id="{B61BEF0D-F0BB-DE4B-95CE-6DB70DBA9567}" type="datetimeFigureOut">
               <a:rPr lang="en-US" dirty="0"/>
               <a:pPr/>
-              <a:t>1/11/2024</a:t>
+              <a:t>2024-01-12</a:t>
             </a:fld>
             <a:endParaRPr lang="en-US" dirty="0"/>
           </a:p>
@@ -3024,7 +3034,7 @@
             <a:fld id="{B61BEF0D-F0BB-DE4B-95CE-6DB70DBA9567}" type="datetimeFigureOut">
               <a:rPr lang="en-US" dirty="0"/>
               <a:pPr/>
-              <a:t>1/11/2024</a:t>
+              <a:t>2024-01-12</a:t>
             </a:fld>
             <a:endParaRPr lang="en-US" dirty="0"/>
           </a:p>
@@ -3232,7 +3242,7 @@
             <a:fld id="{B61BEF0D-F0BB-DE4B-95CE-6DB70DBA9567}" type="datetimeFigureOut">
               <a:rPr lang="en-US" dirty="0"/>
               <a:pPr/>
-              <a:t>1/11/2024</a:t>
+              <a:t>2024-01-12</a:t>
             </a:fld>
             <a:endParaRPr lang="en-US" dirty="0"/>
           </a:p>
@@ -3996,6 +4006,729 @@
 </p:sld>
 </file>
 
+<file path=ppt/slides/slide11.xml><?xml version="1.0" encoding="utf-8"?>
+<p:sld xmlns:a="http://schemas.openxmlformats.org/drawingml/2006/main" xmlns:r="http://schemas.openxmlformats.org/officeDocument/2006/relationships" xmlns:p="http://schemas.openxmlformats.org/presentationml/2006/main">
+  <p:cSld>
+    <p:spTree>
+      <p:nvGrpSpPr>
+        <p:cNvPr id="1" name=""/>
+        <p:cNvGrpSpPr/>
+        <p:nvPr/>
+      </p:nvGrpSpPr>
+      <p:grpSpPr>
+        <a:xfrm>
+          <a:off x="0" y="0"/>
+          <a:ext cx="0" cy="0"/>
+          <a:chOff x="0" y="0"/>
+          <a:chExt cx="0" cy="0"/>
+        </a:xfrm>
+      </p:grpSpPr>
+      <p:sp>
+        <p:nvSpPr>
+          <p:cNvPr id="2" name="Title 1"/>
+          <p:cNvSpPr>
+            <a:spLocks noGrp="1"/>
+          </p:cNvSpPr>
+          <p:nvPr>
+            <p:ph type="title"/>
+          </p:nvPr>
+        </p:nvSpPr>
+        <p:spPr/>
+        <p:txBody>
+          <a:bodyPr/>
+          <a:lstStyle/>
+          <a:p>
+            <a:r>
+              <a:rPr lang="en-US" dirty="0" smtClean="0"/>
+              <a:t>Web pages we will implement</a:t>
+            </a:r>
+            <a:endParaRPr lang="en-US" dirty="0"/>
+          </a:p>
+        </p:txBody>
+      </p:sp>
+      <p:pic>
+        <p:nvPicPr>
+          <p:cNvPr id="5" name="Picture 4"/>
+          <p:cNvPicPr>
+            <a:picLocks noChangeAspect="1"/>
+          </p:cNvPicPr>
+          <p:nvPr/>
+        </p:nvPicPr>
+        <p:blipFill>
+          <a:blip r:embed="rId2"/>
+          <a:stretch>
+            <a:fillRect/>
+          </a:stretch>
+        </p:blipFill>
+        <p:spPr>
+          <a:xfrm>
+            <a:off x="469581" y="1993582"/>
+            <a:ext cx="6603956" cy="4594344"/>
+          </a:xfrm>
+          <a:prstGeom prst="rect">
+            <a:avLst/>
+          </a:prstGeom>
+          <a:ln w="12700" cap="sq">
+            <a:solidFill>
+              <a:srgbClr val="000000"/>
+            </a:solidFill>
+            <a:prstDash val="solid"/>
+            <a:miter lim="800000"/>
+          </a:ln>
+          <a:effectLst>
+            <a:outerShdw blurRad="50800" dist="38100" dir="2700000" algn="tl" rotWithShape="0">
+              <a:srgbClr val="000000">
+                <a:alpha val="43000"/>
+              </a:srgbClr>
+            </a:outerShdw>
+          </a:effectLst>
+        </p:spPr>
+      </p:pic>
+      <p:sp>
+        <p:nvSpPr>
+          <p:cNvPr id="6" name="TextBox 5"/>
+          <p:cNvSpPr txBox="1"/>
+          <p:nvPr/>
+        </p:nvSpPr>
+        <p:spPr>
+          <a:xfrm>
+            <a:off x="7778931" y="1993582"/>
+            <a:ext cx="2717074" cy="2585323"/>
+          </a:xfrm>
+          <a:prstGeom prst="rect">
+            <a:avLst/>
+          </a:prstGeom>
+          <a:noFill/>
+        </p:spPr>
+        <p:txBody>
+          <a:bodyPr wrap="square" rtlCol="0">
+            <a:spAutoFit/>
+          </a:bodyPr>
+          <a:lstStyle/>
+          <a:p>
+            <a:r>
+              <a:rPr lang="en-US" dirty="0" smtClean="0"/>
+              <a:t>Type 1 – Display all information of a table. Allow users to add, edit, remove data from table.</a:t>
+            </a:r>
+          </a:p>
+          <a:p>
+            <a:endParaRPr lang="en-US" dirty="0"/>
+          </a:p>
+          <a:p>
+            <a:r>
+              <a:rPr lang="en-US" dirty="0" smtClean="0"/>
+              <a:t>We will have one for each table except for Test, Chamber Logs, Chamber Log Info tables.</a:t>
+            </a:r>
+            <a:endParaRPr lang="en-US" dirty="0"/>
+          </a:p>
+        </p:txBody>
+      </p:sp>
+    </p:spTree>
+    <p:extLst>
+      <p:ext uri="{BB962C8B-B14F-4D97-AF65-F5344CB8AC3E}">
+        <p14:creationId xmlns:p14="http://schemas.microsoft.com/office/powerpoint/2010/main" val="4220704470"/>
+      </p:ext>
+    </p:extLst>
+  </p:cSld>
+  <p:clrMapOvr>
+    <a:masterClrMapping/>
+  </p:clrMapOvr>
+</p:sld>
+</file>
+
+<file path=ppt/slides/slide12.xml><?xml version="1.0" encoding="utf-8"?>
+<p:sld xmlns:a="http://schemas.openxmlformats.org/drawingml/2006/main" xmlns:r="http://schemas.openxmlformats.org/officeDocument/2006/relationships" xmlns:p="http://schemas.openxmlformats.org/presentationml/2006/main">
+  <p:cSld>
+    <p:spTree>
+      <p:nvGrpSpPr>
+        <p:cNvPr id="1" name=""/>
+        <p:cNvGrpSpPr/>
+        <p:nvPr/>
+      </p:nvGrpSpPr>
+      <p:grpSpPr>
+        <a:xfrm>
+          <a:off x="0" y="0"/>
+          <a:ext cx="0" cy="0"/>
+          <a:chOff x="0" y="0"/>
+          <a:chExt cx="0" cy="0"/>
+        </a:xfrm>
+      </p:grpSpPr>
+      <p:sp>
+        <p:nvSpPr>
+          <p:cNvPr id="2" name="Title 1"/>
+          <p:cNvSpPr>
+            <a:spLocks noGrp="1"/>
+          </p:cNvSpPr>
+          <p:nvPr>
+            <p:ph type="title"/>
+          </p:nvPr>
+        </p:nvSpPr>
+        <p:spPr/>
+        <p:txBody>
+          <a:bodyPr/>
+          <a:lstStyle/>
+          <a:p>
+            <a:r>
+              <a:rPr lang="en-US" dirty="0" smtClean="0"/>
+              <a:t>Web pages we will implement</a:t>
+            </a:r>
+            <a:endParaRPr lang="en-US" dirty="0"/>
+          </a:p>
+        </p:txBody>
+      </p:sp>
+      <p:sp>
+        <p:nvSpPr>
+          <p:cNvPr id="6" name="TextBox 5"/>
+          <p:cNvSpPr txBox="1"/>
+          <p:nvPr/>
+        </p:nvSpPr>
+        <p:spPr>
+          <a:xfrm>
+            <a:off x="457095" y="1810702"/>
+            <a:ext cx="4722327" cy="923330"/>
+          </a:xfrm>
+          <a:prstGeom prst="rect">
+            <a:avLst/>
+          </a:prstGeom>
+          <a:noFill/>
+        </p:spPr>
+        <p:txBody>
+          <a:bodyPr wrap="square" rtlCol="0">
+            <a:spAutoFit/>
+          </a:bodyPr>
+          <a:lstStyle/>
+          <a:p>
+            <a:r>
+              <a:rPr lang="en-US" dirty="0" smtClean="0"/>
+              <a:t>Type 2 – Covers Chamber Logs, Chamber Log Info tables. Chamber Logs web page links to a page that’s identical to our current log file.</a:t>
+            </a:r>
+          </a:p>
+        </p:txBody>
+      </p:sp>
+      <p:pic>
+        <p:nvPicPr>
+          <p:cNvPr id="3" name="Picture 2"/>
+          <p:cNvPicPr>
+            <a:picLocks noChangeAspect="1"/>
+          </p:cNvPicPr>
+          <p:nvPr/>
+        </p:nvPicPr>
+        <p:blipFill>
+          <a:blip r:embed="rId2"/>
+          <a:stretch>
+            <a:fillRect/>
+          </a:stretch>
+        </p:blipFill>
+        <p:spPr>
+          <a:xfrm>
+            <a:off x="457096" y="3019687"/>
+            <a:ext cx="5028961" cy="3506708"/>
+          </a:xfrm>
+          <a:prstGeom prst="rect">
+            <a:avLst/>
+          </a:prstGeom>
+          <a:ln w="12700" cap="sq">
+            <a:solidFill>
+              <a:srgbClr val="000000"/>
+            </a:solidFill>
+            <a:prstDash val="solid"/>
+            <a:miter lim="800000"/>
+          </a:ln>
+          <a:effectLst>
+            <a:outerShdw blurRad="50800" dist="38100" dir="2700000" algn="tl" rotWithShape="0">
+              <a:srgbClr val="000000">
+                <a:alpha val="43000"/>
+              </a:srgbClr>
+            </a:outerShdw>
+          </a:effectLst>
+        </p:spPr>
+      </p:pic>
+      <p:pic>
+        <p:nvPicPr>
+          <p:cNvPr id="7" name="Picture 6"/>
+          <p:cNvPicPr>
+            <a:picLocks noChangeAspect="1"/>
+          </p:cNvPicPr>
+          <p:nvPr/>
+        </p:nvPicPr>
+        <p:blipFill>
+          <a:blip r:embed="rId3">
+            <a:extLst>
+              <a:ext uri="{28A0092B-C50C-407E-A947-70E740481C1C}">
+                <a14:useLocalDpi xmlns:a14="http://schemas.microsoft.com/office/drawing/2010/main" val="0"/>
+              </a:ext>
+            </a:extLst>
+          </a:blip>
+          <a:stretch>
+            <a:fillRect/>
+          </a:stretch>
+        </p:blipFill>
+        <p:spPr>
+          <a:xfrm>
+            <a:off x="5625736" y="1889079"/>
+            <a:ext cx="6183087" cy="4637316"/>
+          </a:xfrm>
+          <a:prstGeom prst="rect">
+            <a:avLst/>
+          </a:prstGeom>
+        </p:spPr>
+      </p:pic>
+    </p:spTree>
+    <p:extLst>
+      <p:ext uri="{BB962C8B-B14F-4D97-AF65-F5344CB8AC3E}">
+        <p14:creationId xmlns:p14="http://schemas.microsoft.com/office/powerpoint/2010/main" val="2059673977"/>
+      </p:ext>
+    </p:extLst>
+  </p:cSld>
+  <p:clrMapOvr>
+    <a:masterClrMapping/>
+  </p:clrMapOvr>
+</p:sld>
+</file>
+
+<file path=ppt/slides/slide13.xml><?xml version="1.0" encoding="utf-8"?>
+<p:sld xmlns:a="http://schemas.openxmlformats.org/drawingml/2006/main" xmlns:r="http://schemas.openxmlformats.org/officeDocument/2006/relationships" xmlns:p="http://schemas.openxmlformats.org/presentationml/2006/main">
+  <p:cSld>
+    <p:spTree>
+      <p:nvGrpSpPr>
+        <p:cNvPr id="1" name=""/>
+        <p:cNvGrpSpPr/>
+        <p:nvPr/>
+      </p:nvGrpSpPr>
+      <p:grpSpPr>
+        <a:xfrm>
+          <a:off x="0" y="0"/>
+          <a:ext cx="0" cy="0"/>
+          <a:chOff x="0" y="0"/>
+          <a:chExt cx="0" cy="0"/>
+        </a:xfrm>
+      </p:grpSpPr>
+      <p:sp>
+        <p:nvSpPr>
+          <p:cNvPr id="2" name="Title 1"/>
+          <p:cNvSpPr>
+            <a:spLocks noGrp="1"/>
+          </p:cNvSpPr>
+          <p:nvPr>
+            <p:ph type="title"/>
+          </p:nvPr>
+        </p:nvSpPr>
+        <p:spPr/>
+        <p:txBody>
+          <a:bodyPr/>
+          <a:lstStyle/>
+          <a:p>
+            <a:r>
+              <a:rPr lang="en-US" dirty="0" smtClean="0"/>
+              <a:t>Web pages we will implement</a:t>
+            </a:r>
+            <a:endParaRPr lang="en-US" dirty="0"/>
+          </a:p>
+        </p:txBody>
+      </p:sp>
+      <p:sp>
+        <p:nvSpPr>
+          <p:cNvPr id="6" name="TextBox 5"/>
+          <p:cNvSpPr txBox="1"/>
+          <p:nvPr/>
+        </p:nvSpPr>
+        <p:spPr>
+          <a:xfrm>
+            <a:off x="415048" y="1872097"/>
+            <a:ext cx="4918167" cy="1200329"/>
+          </a:xfrm>
+          <a:prstGeom prst="rect">
+            <a:avLst/>
+          </a:prstGeom>
+          <a:noFill/>
+        </p:spPr>
+        <p:txBody>
+          <a:bodyPr wrap="square" rtlCol="0">
+            <a:spAutoFit/>
+          </a:bodyPr>
+          <a:lstStyle/>
+          <a:p>
+            <a:r>
+              <a:rPr lang="en-US" dirty="0" smtClean="0"/>
+              <a:t>Type 3 – Test web page.</a:t>
+            </a:r>
+          </a:p>
+          <a:p>
+            <a:endParaRPr lang="en-US" dirty="0"/>
+          </a:p>
+          <a:p>
+            <a:r>
+              <a:rPr lang="en-US" dirty="0" smtClean="0"/>
+              <a:t>We will add data from other tables to make the web page identical to our equipment status file.</a:t>
+            </a:r>
+            <a:endParaRPr lang="en-US" dirty="0"/>
+          </a:p>
+        </p:txBody>
+      </p:sp>
+      <p:pic>
+        <p:nvPicPr>
+          <p:cNvPr id="3" name="Picture 2"/>
+          <p:cNvPicPr>
+            <a:picLocks noChangeAspect="1"/>
+          </p:cNvPicPr>
+          <p:nvPr/>
+        </p:nvPicPr>
+        <p:blipFill>
+          <a:blip r:embed="rId2"/>
+          <a:stretch>
+            <a:fillRect/>
+          </a:stretch>
+        </p:blipFill>
+        <p:spPr>
+          <a:xfrm>
+            <a:off x="498119" y="3228566"/>
+            <a:ext cx="4988281" cy="3483325"/>
+          </a:xfrm>
+          <a:prstGeom prst="rect">
+            <a:avLst/>
+          </a:prstGeom>
+          <a:ln w="12700" cap="sq">
+            <a:solidFill>
+              <a:srgbClr val="000000"/>
+            </a:solidFill>
+            <a:prstDash val="solid"/>
+            <a:miter lim="800000"/>
+          </a:ln>
+          <a:effectLst>
+            <a:outerShdw blurRad="50800" dist="38100" dir="2700000" algn="tl" rotWithShape="0">
+              <a:srgbClr val="000000">
+                <a:alpha val="43000"/>
+              </a:srgbClr>
+            </a:outerShdw>
+          </a:effectLst>
+        </p:spPr>
+      </p:pic>
+      <p:pic>
+        <p:nvPicPr>
+          <p:cNvPr id="4" name="Picture 3"/>
+          <p:cNvPicPr>
+            <a:picLocks noChangeAspect="1"/>
+          </p:cNvPicPr>
+          <p:nvPr/>
+        </p:nvPicPr>
+        <p:blipFill>
+          <a:blip r:embed="rId3">
+            <a:extLst>
+              <a:ext uri="{28A0092B-C50C-407E-A947-70E740481C1C}">
+                <a14:useLocalDpi xmlns:a14="http://schemas.microsoft.com/office/drawing/2010/main" val="0"/>
+              </a:ext>
+            </a:extLst>
+          </a:blip>
+          <a:stretch>
+            <a:fillRect/>
+          </a:stretch>
+        </p:blipFill>
+        <p:spPr>
+          <a:xfrm>
+            <a:off x="5694041" y="2946227"/>
+            <a:ext cx="6199108" cy="3765663"/>
+          </a:xfrm>
+          <a:prstGeom prst="rect">
+            <a:avLst/>
+          </a:prstGeom>
+        </p:spPr>
+      </p:pic>
+    </p:spTree>
+    <p:extLst>
+      <p:ext uri="{BB962C8B-B14F-4D97-AF65-F5344CB8AC3E}">
+        <p14:creationId xmlns:p14="http://schemas.microsoft.com/office/powerpoint/2010/main" val="2199355817"/>
+      </p:ext>
+    </p:extLst>
+  </p:cSld>
+  <p:clrMapOvr>
+    <a:masterClrMapping/>
+  </p:clrMapOvr>
+</p:sld>
+</file>
+
+<file path=ppt/slides/slide14.xml><?xml version="1.0" encoding="utf-8"?>
+<p:sld xmlns:a="http://schemas.openxmlformats.org/drawingml/2006/main" xmlns:r="http://schemas.openxmlformats.org/officeDocument/2006/relationships" xmlns:p="http://schemas.openxmlformats.org/presentationml/2006/main">
+  <p:cSld>
+    <p:spTree>
+      <p:nvGrpSpPr>
+        <p:cNvPr id="1" name=""/>
+        <p:cNvGrpSpPr/>
+        <p:nvPr/>
+      </p:nvGrpSpPr>
+      <p:grpSpPr>
+        <a:xfrm>
+          <a:off x="0" y="0"/>
+          <a:ext cx="0" cy="0"/>
+          <a:chOff x="0" y="0"/>
+          <a:chExt cx="0" cy="0"/>
+        </a:xfrm>
+      </p:grpSpPr>
+      <p:sp>
+        <p:nvSpPr>
+          <p:cNvPr id="2" name="Title 1"/>
+          <p:cNvSpPr>
+            <a:spLocks noGrp="1"/>
+          </p:cNvSpPr>
+          <p:nvPr>
+            <p:ph type="title"/>
+          </p:nvPr>
+        </p:nvSpPr>
+        <p:spPr/>
+        <p:txBody>
+          <a:bodyPr/>
+          <a:lstStyle/>
+          <a:p>
+            <a:r>
+              <a:rPr lang="en-US" dirty="0" smtClean="0"/>
+              <a:t>Web pages we will implement</a:t>
+            </a:r>
+            <a:endParaRPr lang="en-US" dirty="0"/>
+          </a:p>
+        </p:txBody>
+      </p:sp>
+      <p:sp>
+        <p:nvSpPr>
+          <p:cNvPr id="6" name="TextBox 5"/>
+          <p:cNvSpPr txBox="1"/>
+          <p:nvPr/>
+        </p:nvSpPr>
+        <p:spPr>
+          <a:xfrm>
+            <a:off x="8050289" y="2081101"/>
+            <a:ext cx="2929043" cy="2031325"/>
+          </a:xfrm>
+          <a:prstGeom prst="rect">
+            <a:avLst/>
+          </a:prstGeom>
+          <a:noFill/>
+        </p:spPr>
+        <p:txBody>
+          <a:bodyPr wrap="square" rtlCol="0">
+            <a:spAutoFit/>
+          </a:bodyPr>
+          <a:lstStyle/>
+          <a:p>
+            <a:r>
+              <a:rPr lang="en-US" dirty="0" smtClean="0"/>
+              <a:t>Type 4 – Additional page for programs web page for user friendliness.</a:t>
+            </a:r>
+          </a:p>
+          <a:p>
+            <a:r>
+              <a:rPr lang="en-US" dirty="0" smtClean="0"/>
+              <a:t>This shows a program’s details in its separate page, its tests, maps, compatible equipment.</a:t>
+            </a:r>
+          </a:p>
+        </p:txBody>
+      </p:sp>
+      <p:pic>
+        <p:nvPicPr>
+          <p:cNvPr id="5" name="Picture 4"/>
+          <p:cNvPicPr>
+            <a:picLocks noChangeAspect="1"/>
+          </p:cNvPicPr>
+          <p:nvPr/>
+        </p:nvPicPr>
+        <p:blipFill>
+          <a:blip r:embed="rId2"/>
+          <a:stretch>
+            <a:fillRect/>
+          </a:stretch>
+        </p:blipFill>
+        <p:spPr>
+          <a:xfrm>
+            <a:off x="494346" y="2081101"/>
+            <a:ext cx="6311402" cy="4374302"/>
+          </a:xfrm>
+          <a:prstGeom prst="rect">
+            <a:avLst/>
+          </a:prstGeom>
+          <a:ln w="12700" cap="sq">
+            <a:solidFill>
+              <a:srgbClr val="000000"/>
+            </a:solidFill>
+            <a:prstDash val="solid"/>
+            <a:miter lim="800000"/>
+          </a:ln>
+          <a:effectLst>
+            <a:outerShdw blurRad="50800" dist="38100" dir="2700000" algn="tl" rotWithShape="0">
+              <a:srgbClr val="000000">
+                <a:alpha val="43000"/>
+              </a:srgbClr>
+            </a:outerShdw>
+          </a:effectLst>
+        </p:spPr>
+      </p:pic>
+    </p:spTree>
+    <p:extLst>
+      <p:ext uri="{BB962C8B-B14F-4D97-AF65-F5344CB8AC3E}">
+        <p14:creationId xmlns:p14="http://schemas.microsoft.com/office/powerpoint/2010/main" val="3232652867"/>
+      </p:ext>
+    </p:extLst>
+  </p:cSld>
+  <p:clrMapOvr>
+    <a:masterClrMapping/>
+  </p:clrMapOvr>
+</p:sld>
+</file>
+
+<file path=ppt/slides/slide15.xml><?xml version="1.0" encoding="utf-8"?>
+<p:sld xmlns:a="http://schemas.openxmlformats.org/drawingml/2006/main" xmlns:r="http://schemas.openxmlformats.org/officeDocument/2006/relationships" xmlns:p="http://schemas.openxmlformats.org/presentationml/2006/main">
+  <p:cSld>
+    <p:spTree>
+      <p:nvGrpSpPr>
+        <p:cNvPr id="1" name=""/>
+        <p:cNvGrpSpPr/>
+        <p:nvPr/>
+      </p:nvGrpSpPr>
+      <p:grpSpPr>
+        <a:xfrm>
+          <a:off x="0" y="0"/>
+          <a:ext cx="0" cy="0"/>
+          <a:chOff x="0" y="0"/>
+          <a:chExt cx="0" cy="0"/>
+        </a:xfrm>
+      </p:grpSpPr>
+      <p:sp>
+        <p:nvSpPr>
+          <p:cNvPr id="2" name="Title 1"/>
+          <p:cNvSpPr>
+            <a:spLocks noGrp="1"/>
+          </p:cNvSpPr>
+          <p:nvPr>
+            <p:ph type="title"/>
+          </p:nvPr>
+        </p:nvSpPr>
+        <p:spPr/>
+        <p:txBody>
+          <a:bodyPr/>
+          <a:lstStyle/>
+          <a:p>
+            <a:r>
+              <a:rPr lang="en-US" dirty="0" smtClean="0"/>
+              <a:t>Project timeline estimate</a:t>
+            </a:r>
+            <a:endParaRPr lang="en-US" dirty="0"/>
+          </a:p>
+        </p:txBody>
+      </p:sp>
+      <p:pic>
+        <p:nvPicPr>
+          <p:cNvPr id="4" name="Picture 3"/>
+          <p:cNvPicPr>
+            <a:picLocks noChangeAspect="1"/>
+          </p:cNvPicPr>
+          <p:nvPr/>
+        </p:nvPicPr>
+        <p:blipFill>
+          <a:blip r:embed="rId2"/>
+          <a:stretch>
+            <a:fillRect/>
+          </a:stretch>
+        </p:blipFill>
+        <p:spPr>
+          <a:xfrm>
+            <a:off x="464276" y="2103120"/>
+            <a:ext cx="6733359" cy="3397010"/>
+          </a:xfrm>
+          <a:prstGeom prst="rect">
+            <a:avLst/>
+          </a:prstGeom>
+        </p:spPr>
+      </p:pic>
+      <p:sp>
+        <p:nvSpPr>
+          <p:cNvPr id="5" name="TextBox 4"/>
+          <p:cNvSpPr txBox="1"/>
+          <p:nvPr/>
+        </p:nvSpPr>
+        <p:spPr>
+          <a:xfrm>
+            <a:off x="7896497" y="1933302"/>
+            <a:ext cx="4095205" cy="3970318"/>
+          </a:xfrm>
+          <a:prstGeom prst="rect">
+            <a:avLst/>
+          </a:prstGeom>
+          <a:noFill/>
+        </p:spPr>
+        <p:txBody>
+          <a:bodyPr wrap="square" rtlCol="0">
+            <a:spAutoFit/>
+          </a:bodyPr>
+          <a:lstStyle/>
+          <a:p>
+            <a:r>
+              <a:rPr lang="en-US" dirty="0" smtClean="0"/>
+              <a:t>Our method of operation, and estimation: </a:t>
+            </a:r>
+          </a:p>
+          <a:p>
+            <a:pPr marL="285750" indent="-285750">
+              <a:buFontTx/>
+              <a:buChar char="-"/>
+            </a:pPr>
+            <a:r>
+              <a:rPr lang="en-US" dirty="0" smtClean="0"/>
+              <a:t>Will program a web page type, link them to their intended tables, then move onto the next type.</a:t>
+            </a:r>
+          </a:p>
+          <a:p>
+            <a:pPr marL="285750" indent="-285750">
+              <a:buFontTx/>
+              <a:buChar char="-"/>
+            </a:pPr>
+            <a:r>
+              <a:rPr lang="en-US" dirty="0" smtClean="0"/>
+              <a:t>Each type we estimate takes 2 weeks to develop.</a:t>
+            </a:r>
+          </a:p>
+          <a:p>
+            <a:pPr marL="285750" indent="-285750">
+              <a:buFontTx/>
+              <a:buChar char="-"/>
+            </a:pPr>
+            <a:r>
+              <a:rPr lang="en-US" dirty="0" smtClean="0"/>
+              <a:t>Each table link (web page for that table taken from the template) takes a day.</a:t>
+            </a:r>
+          </a:p>
+          <a:p>
+            <a:pPr marL="285750" indent="-285750">
+              <a:buFontTx/>
+              <a:buChar char="-"/>
+            </a:pPr>
+            <a:r>
+              <a:rPr lang="en-US" dirty="0" smtClean="0"/>
+              <a:t>Then, we will create a menu, add user roles, logins, present to the team, do a trial run, publish the web app.</a:t>
+            </a:r>
+          </a:p>
+          <a:p>
+            <a:pPr marL="285750" indent="-285750">
+              <a:buFontTx/>
+              <a:buChar char="-"/>
+            </a:pPr>
+            <a:r>
+              <a:rPr lang="en-US" dirty="0" smtClean="0"/>
+              <a:t>Current estimation is we will have the package ready for trial run by mid-April.</a:t>
+            </a:r>
+            <a:endParaRPr lang="en-US" dirty="0"/>
+          </a:p>
+        </p:txBody>
+      </p:sp>
+    </p:spTree>
+    <p:extLst>
+      <p:ext uri="{BB962C8B-B14F-4D97-AF65-F5344CB8AC3E}">
+        <p14:creationId xmlns:p14="http://schemas.microsoft.com/office/powerpoint/2010/main" val="3572436514"/>
+      </p:ext>
+    </p:extLst>
+  </p:cSld>
+  <p:clrMapOvr>
+    <a:masterClrMapping/>
+  </p:clrMapOvr>
+</p:sld>
+</file>
+
 <file path=ppt/slides/slide2.xml><?xml version="1.0" encoding="utf-8"?>
 <p:sld xmlns:a="http://schemas.openxmlformats.org/drawingml/2006/main" xmlns:r="http://schemas.openxmlformats.org/officeDocument/2006/relationships" xmlns:p="http://schemas.openxmlformats.org/presentationml/2006/main">
   <p:cSld>

</xml_diff>